<commit_message>
Added a spectrum page
</commit_message>
<xml_diff>
--- a/SmartLiteDemo.pptx
+++ b/SmartLiteDemo.pptx
@@ -7,9 +7,10 @@
   <p:sldIdLst>
     <p:sldId id="256" r:id="rId2"/>
     <p:sldId id="257" r:id="rId3"/>
-    <p:sldId id="258" r:id="rId4"/>
-    <p:sldId id="259" r:id="rId5"/>
-    <p:sldId id="260" r:id="rId6"/>
+    <p:sldId id="261" r:id="rId4"/>
+    <p:sldId id="258" r:id="rId5"/>
+    <p:sldId id="259" r:id="rId6"/>
+    <p:sldId id="260" r:id="rId7"/>
   </p:sldIdLst>
   <p:sldSz cx="12192000" cy="6858000"/>
   <p:notesSz cx="6858000" cy="9144000"/>
@@ -108,6 +109,11 @@
       </a:defRPr>
     </a:lvl9pPr>
   </p:defaultTextStyle>
+  <p:extLst>
+    <p:ext uri="{EFAFB233-063F-42B5-8137-9DF3F51BA10A}">
+      <p15:sldGuideLst xmlns:p15="http://schemas.microsoft.com/office/powerpoint/2012/main"/>
+    </p:ext>
+  </p:extLst>
 </p:presentation>
 </file>
 
@@ -5944,270 +5950,24 @@
           <a:p>
             <a:r>
               <a:rPr lang="en-US" dirty="0" smtClean="0"/>
-              <a:t>How it works</a:t>
-            </a:r>
-            <a:endParaRPr lang="en-US" dirty="0"/>
-          </a:p>
-        </p:txBody>
-      </p:sp>
-      <p:pic>
-        <p:nvPicPr>
-          <p:cNvPr id="2050" name="Picture 2" descr="https://pbs.twimg.com/profile_images/615680132565504000/EIpgSD2K.png"/>
-          <p:cNvPicPr>
-            <a:picLocks noChangeAspect="1" noChangeArrowheads="1"/>
-          </p:cNvPicPr>
-          <p:nvPr/>
-        </p:nvPicPr>
-        <p:blipFill>
-          <a:blip r:embed="rId2">
-            <a:extLst>
-              <a:ext uri="{28A0092B-C50C-407E-A947-70E740481C1C}">
-                <a14:useLocalDpi xmlns:a14="http://schemas.microsoft.com/office/drawing/2010/main" val="0"/>
-              </a:ext>
-            </a:extLst>
-          </a:blip>
-          <a:srcRect/>
-          <a:stretch>
-            <a:fillRect/>
-          </a:stretch>
-        </p:blipFill>
-        <p:spPr bwMode="auto">
-          <a:xfrm>
-            <a:off x="0" y="1507524"/>
-            <a:ext cx="2439558" cy="2439559"/>
-          </a:xfrm>
-          <a:prstGeom prst="rect">
-            <a:avLst/>
-          </a:prstGeom>
-          <a:noFill/>
-          <a:extLst>
-            <a:ext uri="{909E8E84-426E-40DD-AFC4-6F175D3DCCD1}">
-              <a14:hiddenFill xmlns:a14="http://schemas.microsoft.com/office/drawing/2010/main">
-                <a:solidFill>
-                  <a:srgbClr val="FFFFFF"/>
-                </a:solidFill>
-              </a14:hiddenFill>
-            </a:ext>
-          </a:extLst>
-        </p:spPr>
-      </p:pic>
-      <p:pic>
-        <p:nvPicPr>
-          <p:cNvPr id="2052" name="Picture 4" descr="http://vignette4.wikia.nocookie.net/ldpsusoaweb/images/e/e4/Python.png/revision/latest?cb=20140605203715&amp;path-prefix=es"/>
-          <p:cNvPicPr>
-            <a:picLocks noChangeAspect="1" noChangeArrowheads="1"/>
-          </p:cNvPicPr>
-          <p:nvPr/>
-        </p:nvPicPr>
-        <p:blipFill>
-          <a:blip r:embed="rId3">
-            <a:extLst>
-              <a:ext uri="{28A0092B-C50C-407E-A947-70E740481C1C}">
-                <a14:useLocalDpi xmlns:a14="http://schemas.microsoft.com/office/drawing/2010/main" val="0"/>
-              </a:ext>
-            </a:extLst>
-          </a:blip>
-          <a:srcRect/>
-          <a:stretch>
-            <a:fillRect/>
-          </a:stretch>
-        </p:blipFill>
-        <p:spPr bwMode="auto">
-          <a:xfrm>
-            <a:off x="3355600" y="1878935"/>
-            <a:ext cx="1898113" cy="1898113"/>
-          </a:xfrm>
-          <a:prstGeom prst="rect">
-            <a:avLst/>
-          </a:prstGeom>
-          <a:noFill/>
-          <a:extLst>
-            <a:ext uri="{909E8E84-426E-40DD-AFC4-6F175D3DCCD1}">
-              <a14:hiddenFill xmlns:a14="http://schemas.microsoft.com/office/drawing/2010/main">
-                <a:solidFill>
-                  <a:srgbClr val="FFFFFF"/>
-                </a:solidFill>
-              </a14:hiddenFill>
-            </a:ext>
-          </a:extLst>
-        </p:spPr>
-      </p:pic>
-      <p:pic>
-        <p:nvPicPr>
-          <p:cNvPr id="2054" name="Picture 6" descr="http://staging.indico.io/static/img/big-icon.jpg"/>
-          <p:cNvPicPr>
-            <a:picLocks noChangeAspect="1" noChangeArrowheads="1"/>
-          </p:cNvPicPr>
-          <p:nvPr/>
-        </p:nvPicPr>
-        <p:blipFill>
-          <a:blip r:embed="rId4">
-            <a:extLst>
-              <a:ext uri="{28A0092B-C50C-407E-A947-70E740481C1C}">
-                <a14:useLocalDpi xmlns:a14="http://schemas.microsoft.com/office/drawing/2010/main" val="0"/>
-              </a:ext>
-            </a:extLst>
-          </a:blip>
-          <a:srcRect/>
-          <a:stretch>
-            <a:fillRect/>
-          </a:stretch>
-        </p:blipFill>
-        <p:spPr bwMode="auto">
-          <a:xfrm>
-            <a:off x="6324749" y="1775445"/>
-            <a:ext cx="1905000" cy="1905000"/>
-          </a:xfrm>
-          <a:prstGeom prst="rect">
-            <a:avLst/>
-          </a:prstGeom>
-          <a:noFill/>
-          <a:extLst>
-            <a:ext uri="{909E8E84-426E-40DD-AFC4-6F175D3DCCD1}">
-              <a14:hiddenFill xmlns:a14="http://schemas.microsoft.com/office/drawing/2010/main">
-                <a:solidFill>
-                  <a:srgbClr val="FFFFFF"/>
-                </a:solidFill>
-              </a14:hiddenFill>
-            </a:ext>
-          </a:extLst>
-        </p:spPr>
-      </p:pic>
-      <p:pic>
-        <p:nvPicPr>
-          <p:cNvPr id="2056" name="Picture 8" descr="http://www.passmark.com/images/serial-port.jpg"/>
-          <p:cNvPicPr>
-            <a:picLocks noChangeAspect="1" noChangeArrowheads="1"/>
-          </p:cNvPicPr>
-          <p:nvPr/>
-        </p:nvPicPr>
-        <p:blipFill>
-          <a:blip r:embed="rId5">
-            <a:extLst>
-              <a:ext uri="{28A0092B-C50C-407E-A947-70E740481C1C}">
-                <a14:useLocalDpi xmlns:a14="http://schemas.microsoft.com/office/drawing/2010/main" val="0"/>
-              </a:ext>
-            </a:extLst>
-          </a:blip>
-          <a:srcRect/>
-          <a:stretch>
-            <a:fillRect/>
-          </a:stretch>
-        </p:blipFill>
-        <p:spPr bwMode="auto">
-          <a:xfrm>
-            <a:off x="9138904" y="1750153"/>
-            <a:ext cx="2170734" cy="2170734"/>
-          </a:xfrm>
-          <a:prstGeom prst="rect">
-            <a:avLst/>
-          </a:prstGeom>
-          <a:noFill/>
-          <a:extLst>
-            <a:ext uri="{909E8E84-426E-40DD-AFC4-6F175D3DCCD1}">
-              <a14:hiddenFill xmlns:a14="http://schemas.microsoft.com/office/drawing/2010/main">
-                <a:solidFill>
-                  <a:srgbClr val="FFFFFF"/>
-                </a:solidFill>
-              </a14:hiddenFill>
-            </a:ext>
-          </a:extLst>
-        </p:spPr>
-      </p:pic>
-      <p:pic>
-        <p:nvPicPr>
-          <p:cNvPr id="2058" name="Picture 10" descr="https://upload.wikimedia.org/wikipedia/commons/3/38/Arduino_Uno_-_R3.jpg"/>
-          <p:cNvPicPr>
-            <a:picLocks noChangeAspect="1" noChangeArrowheads="1"/>
-          </p:cNvPicPr>
-          <p:nvPr/>
-        </p:nvPicPr>
-        <p:blipFill>
-          <a:blip r:embed="rId6">
-            <a:extLst>
-              <a:ext uri="{28A0092B-C50C-407E-A947-70E740481C1C}">
-                <a14:useLocalDpi xmlns:a14="http://schemas.microsoft.com/office/drawing/2010/main" val="0"/>
-              </a:ext>
-            </a:extLst>
-          </a:blip>
-          <a:srcRect/>
-          <a:stretch>
-            <a:fillRect/>
-          </a:stretch>
-        </p:blipFill>
-        <p:spPr bwMode="auto">
-          <a:xfrm>
-            <a:off x="2439558" y="4243431"/>
-            <a:ext cx="2369494" cy="2369494"/>
-          </a:xfrm>
-          <a:prstGeom prst="rect">
-            <a:avLst/>
-          </a:prstGeom>
-          <a:noFill/>
-          <a:extLst>
-            <a:ext uri="{909E8E84-426E-40DD-AFC4-6F175D3DCCD1}">
-              <a14:hiddenFill xmlns:a14="http://schemas.microsoft.com/office/drawing/2010/main">
-                <a:solidFill>
-                  <a:srgbClr val="FFFFFF"/>
-                </a:solidFill>
-              </a14:hiddenFill>
-            </a:ext>
-          </a:extLst>
-        </p:spPr>
-      </p:pic>
-      <p:pic>
-        <p:nvPicPr>
-          <p:cNvPr id="2060" name="Picture 12" descr="https://cdn.sparkfun.com/assets/parts/9/3/7/3/12662-01a.jpg"/>
-          <p:cNvPicPr>
-            <a:picLocks noChangeAspect="1" noChangeArrowheads="1"/>
-          </p:cNvPicPr>
-          <p:nvPr/>
-        </p:nvPicPr>
-        <p:blipFill>
-          <a:blip r:embed="rId7">
-            <a:extLst>
-              <a:ext uri="{28A0092B-C50C-407E-A947-70E740481C1C}">
-                <a14:useLocalDpi xmlns:a14="http://schemas.microsoft.com/office/drawing/2010/main" val="0"/>
-              </a:ext>
-            </a:extLst>
-          </a:blip>
-          <a:srcRect/>
-          <a:stretch>
-            <a:fillRect/>
-          </a:stretch>
-        </p:blipFill>
-        <p:spPr bwMode="auto">
-          <a:xfrm>
-            <a:off x="7297780" y="3952250"/>
-            <a:ext cx="2834762" cy="2834762"/>
-          </a:xfrm>
-          <a:prstGeom prst="rect">
-            <a:avLst/>
-          </a:prstGeom>
-          <a:noFill/>
-          <a:extLst>
-            <a:ext uri="{909E8E84-426E-40DD-AFC4-6F175D3DCCD1}">
-              <a14:hiddenFill xmlns:a14="http://schemas.microsoft.com/office/drawing/2010/main">
-                <a:solidFill>
-                  <a:srgbClr val="FFFFFF"/>
-                </a:solidFill>
-              </a14:hiddenFill>
-            </a:ext>
-          </a:extLst>
-        </p:spPr>
-      </p:pic>
-      <p:sp>
-        <p:nvSpPr>
-          <p:cNvPr id="4" name="Right Arrow 3"/>
+              <a:t>The Spectrum</a:t>
+            </a:r>
+            <a:endParaRPr lang="en-US" dirty="0"/>
+          </a:p>
+        </p:txBody>
+      </p:sp>
+      <p:sp>
+        <p:nvSpPr>
+          <p:cNvPr id="4" name="Rectangle 3"/>
           <p:cNvSpPr/>
           <p:nvPr/>
         </p:nvSpPr>
         <p:spPr>
           <a:xfrm>
-            <a:off x="2331308" y="2496065"/>
-            <a:ext cx="774357" cy="667265"/>
-          </a:xfrm>
-          <a:prstGeom prst="rightArrow">
+            <a:off x="409830" y="2730842"/>
+            <a:ext cx="1979143" cy="1437503"/>
+          </a:xfrm>
+          <a:prstGeom prst="rect">
             <a:avLst/>
           </a:prstGeom>
         </p:spPr>
@@ -6238,30 +5998,30 @@
       </p:sp>
       <p:sp>
         <p:nvSpPr>
-          <p:cNvPr id="11" name="Right Arrow 10"/>
+          <p:cNvPr id="5" name="Rectangle 4"/>
           <p:cNvSpPr/>
           <p:nvPr/>
         </p:nvSpPr>
         <p:spPr>
           <a:xfrm>
-            <a:off x="5855192" y="5035997"/>
-            <a:ext cx="774357" cy="667265"/>
-          </a:xfrm>
-          <a:prstGeom prst="rightArrow">
+            <a:off x="2388973" y="2730840"/>
+            <a:ext cx="1828800" cy="1437503"/>
+          </a:xfrm>
+          <a:prstGeom prst="rect">
             <a:avLst/>
           </a:prstGeom>
         </p:spPr>
         <p:style>
           <a:lnRef idx="2">
-            <a:schemeClr val="accent1">
+            <a:schemeClr val="accent2">
               <a:shade val="50000"/>
             </a:schemeClr>
           </a:lnRef>
           <a:fillRef idx="1">
-            <a:schemeClr val="accent1"/>
+            <a:schemeClr val="accent2"/>
           </a:fillRef>
           <a:effectRef idx="0">
-            <a:schemeClr val="accent1"/>
+            <a:schemeClr val="accent2"/>
           </a:effectRef>
           <a:fontRef idx="minor">
             <a:schemeClr val="lt1"/>
@@ -6278,30 +6038,30 @@
       </p:sp>
       <p:sp>
         <p:nvSpPr>
-          <p:cNvPr id="12" name="Right Arrow 11"/>
+          <p:cNvPr id="6" name="Rectangle 5"/>
           <p:cNvSpPr/>
           <p:nvPr/>
         </p:nvSpPr>
         <p:spPr>
           <a:xfrm>
-            <a:off x="1219779" y="5035998"/>
-            <a:ext cx="774357" cy="667265"/>
-          </a:xfrm>
-          <a:prstGeom prst="rightArrow">
+            <a:off x="4217774" y="2730840"/>
+            <a:ext cx="1845276" cy="1437503"/>
+          </a:xfrm>
+          <a:prstGeom prst="rect">
             <a:avLst/>
           </a:prstGeom>
         </p:spPr>
         <p:style>
           <a:lnRef idx="2">
-            <a:schemeClr val="accent1">
+            <a:schemeClr val="accent3">
               <a:shade val="50000"/>
             </a:schemeClr>
           </a:lnRef>
           <a:fillRef idx="1">
-            <a:schemeClr val="accent1"/>
+            <a:schemeClr val="accent3"/>
           </a:fillRef>
           <a:effectRef idx="0">
-            <a:schemeClr val="accent1"/>
+            <a:schemeClr val="accent3"/>
           </a:effectRef>
           <a:fontRef idx="minor">
             <a:schemeClr val="lt1"/>
@@ -6318,30 +6078,30 @@
       </p:sp>
       <p:sp>
         <p:nvSpPr>
-          <p:cNvPr id="13" name="Right Arrow 12"/>
+          <p:cNvPr id="7" name="Rectangle 6"/>
           <p:cNvSpPr/>
           <p:nvPr/>
         </p:nvSpPr>
         <p:spPr>
           <a:xfrm>
-            <a:off x="8211954" y="2501886"/>
-            <a:ext cx="774357" cy="667265"/>
-          </a:xfrm>
-          <a:prstGeom prst="rightArrow">
+            <a:off x="6063051" y="2730840"/>
+            <a:ext cx="1960604" cy="1437504"/>
+          </a:xfrm>
+          <a:prstGeom prst="rect">
             <a:avLst/>
           </a:prstGeom>
         </p:spPr>
         <p:style>
           <a:lnRef idx="2">
-            <a:schemeClr val="accent1">
+            <a:schemeClr val="accent6">
               <a:shade val="50000"/>
             </a:schemeClr>
           </a:lnRef>
           <a:fillRef idx="1">
-            <a:schemeClr val="accent1"/>
+            <a:schemeClr val="accent6"/>
           </a:fillRef>
           <a:effectRef idx="0">
-            <a:schemeClr val="accent1"/>
+            <a:schemeClr val="accent6"/>
           </a:effectRef>
           <a:fontRef idx="minor">
             <a:schemeClr val="lt1"/>
@@ -6358,30 +6118,30 @@
       </p:sp>
       <p:sp>
         <p:nvSpPr>
-          <p:cNvPr id="14" name="Right Arrow 13"/>
+          <p:cNvPr id="8" name="Rectangle 7"/>
           <p:cNvSpPr/>
           <p:nvPr/>
         </p:nvSpPr>
         <p:spPr>
           <a:xfrm>
-            <a:off x="5468014" y="2501887"/>
-            <a:ext cx="774357" cy="667265"/>
-          </a:xfrm>
-          <a:prstGeom prst="rightArrow">
+            <a:off x="8023654" y="2730839"/>
+            <a:ext cx="1713473" cy="1437503"/>
+          </a:xfrm>
+          <a:prstGeom prst="rect">
             <a:avLst/>
           </a:prstGeom>
         </p:spPr>
         <p:style>
           <a:lnRef idx="2">
-            <a:schemeClr val="accent1">
+            <a:schemeClr val="accent5">
               <a:shade val="50000"/>
             </a:schemeClr>
           </a:lnRef>
           <a:fillRef idx="1">
-            <a:schemeClr val="accent1"/>
+            <a:schemeClr val="accent5"/>
           </a:fillRef>
           <a:effectRef idx="0">
-            <a:schemeClr val="accent1"/>
+            <a:schemeClr val="accent5"/>
           </a:effectRef>
           <a:fontRef idx="minor">
             <a:schemeClr val="lt1"/>
@@ -6396,10 +6156,230 @@
           </a:p>
         </p:txBody>
       </p:sp>
+      <p:sp>
+        <p:nvSpPr>
+          <p:cNvPr id="9" name="Rectangle 8"/>
+          <p:cNvSpPr/>
+          <p:nvPr/>
+        </p:nvSpPr>
+        <p:spPr>
+          <a:xfrm>
+            <a:off x="9737127" y="2730836"/>
+            <a:ext cx="1960604" cy="1437505"/>
+          </a:xfrm>
+          <a:prstGeom prst="rect">
+            <a:avLst/>
+          </a:prstGeom>
+        </p:spPr>
+        <p:style>
+          <a:lnRef idx="2">
+            <a:schemeClr val="accent4">
+              <a:shade val="50000"/>
+            </a:schemeClr>
+          </a:lnRef>
+          <a:fillRef idx="1">
+            <a:schemeClr val="accent4"/>
+          </a:fillRef>
+          <a:effectRef idx="0">
+            <a:schemeClr val="accent4"/>
+          </a:effectRef>
+          <a:fontRef idx="minor">
+            <a:schemeClr val="lt1"/>
+          </a:fontRef>
+        </p:style>
+        <p:txBody>
+          <a:bodyPr rtlCol="0" anchor="ctr"/>
+          <a:lstStyle/>
+          <a:p>
+            <a:pPr algn="ctr"/>
+            <a:endParaRPr lang="en-US"/>
+          </a:p>
+        </p:txBody>
+      </p:sp>
+      <p:sp>
+        <p:nvSpPr>
+          <p:cNvPr id="10" name="TextBox 9"/>
+          <p:cNvSpPr txBox="1"/>
+          <p:nvPr/>
+        </p:nvSpPr>
+        <p:spPr>
+          <a:xfrm>
+            <a:off x="781283" y="4291048"/>
+            <a:ext cx="1236236" cy="646331"/>
+          </a:xfrm>
+          <a:prstGeom prst="rect">
+            <a:avLst/>
+          </a:prstGeom>
+          <a:noFill/>
+        </p:spPr>
+        <p:txBody>
+          <a:bodyPr wrap="none" rtlCol="0">
+            <a:spAutoFit/>
+          </a:bodyPr>
+          <a:lstStyle/>
+          <a:p>
+            <a:r>
+              <a:rPr lang="en-US" sz="3600" dirty="0" smtClean="0"/>
+              <a:t>0-.25</a:t>
+            </a:r>
+            <a:endParaRPr lang="en-US" sz="3600" dirty="0"/>
+          </a:p>
+        </p:txBody>
+      </p:sp>
+      <p:sp>
+        <p:nvSpPr>
+          <p:cNvPr id="11" name="TextBox 10"/>
+          <p:cNvSpPr txBox="1"/>
+          <p:nvPr/>
+        </p:nvSpPr>
+        <p:spPr>
+          <a:xfrm>
+            <a:off x="3365156" y="4290182"/>
+            <a:ext cx="2928551" cy="646331"/>
+          </a:xfrm>
+          <a:prstGeom prst="rect">
+            <a:avLst/>
+          </a:prstGeom>
+          <a:noFill/>
+        </p:spPr>
+        <p:txBody>
+          <a:bodyPr wrap="square" rtlCol="0">
+            <a:spAutoFit/>
+          </a:bodyPr>
+          <a:lstStyle/>
+          <a:p>
+            <a:r>
+              <a:rPr lang="en-US" sz="3600" dirty="0" smtClean="0"/>
+              <a:t>.25-.50</a:t>
+            </a:r>
+            <a:endParaRPr lang="en-US" sz="3600" dirty="0"/>
+          </a:p>
+        </p:txBody>
+      </p:sp>
+      <p:sp>
+        <p:nvSpPr>
+          <p:cNvPr id="12" name="TextBox 11"/>
+          <p:cNvSpPr txBox="1"/>
+          <p:nvPr/>
+        </p:nvSpPr>
+        <p:spPr>
+          <a:xfrm>
+            <a:off x="8069911" y="4290181"/>
+            <a:ext cx="1620957" cy="646331"/>
+          </a:xfrm>
+          <a:prstGeom prst="rect">
+            <a:avLst/>
+          </a:prstGeom>
+          <a:noFill/>
+        </p:spPr>
+        <p:txBody>
+          <a:bodyPr wrap="none" rtlCol="0">
+            <a:spAutoFit/>
+          </a:bodyPr>
+          <a:lstStyle/>
+          <a:p>
+            <a:r>
+              <a:rPr lang="en-US" sz="3600" dirty="0" smtClean="0"/>
+              <a:t>.70-.75</a:t>
+            </a:r>
+            <a:endParaRPr lang="en-US" sz="3600" dirty="0"/>
+          </a:p>
+        </p:txBody>
+      </p:sp>
+      <p:sp>
+        <p:nvSpPr>
+          <p:cNvPr id="13" name="TextBox 12"/>
+          <p:cNvSpPr txBox="1"/>
+          <p:nvPr/>
+        </p:nvSpPr>
+        <p:spPr>
+          <a:xfrm>
+            <a:off x="6232872" y="4290182"/>
+            <a:ext cx="1620957" cy="646331"/>
+          </a:xfrm>
+          <a:prstGeom prst="rect">
+            <a:avLst/>
+          </a:prstGeom>
+          <a:noFill/>
+        </p:spPr>
+        <p:txBody>
+          <a:bodyPr wrap="none" rtlCol="0">
+            <a:spAutoFit/>
+          </a:bodyPr>
+          <a:lstStyle/>
+          <a:p>
+            <a:r>
+              <a:rPr lang="en-US" sz="3600" dirty="0" smtClean="0"/>
+              <a:t>.50-.70</a:t>
+            </a:r>
+            <a:endParaRPr lang="en-US" sz="3600" dirty="0"/>
+          </a:p>
+        </p:txBody>
+      </p:sp>
+      <p:sp>
+        <p:nvSpPr>
+          <p:cNvPr id="14" name="TextBox 13"/>
+          <p:cNvSpPr txBox="1"/>
+          <p:nvPr/>
+        </p:nvSpPr>
+        <p:spPr>
+          <a:xfrm>
+            <a:off x="9906950" y="4290181"/>
+            <a:ext cx="1620957" cy="646331"/>
+          </a:xfrm>
+          <a:prstGeom prst="rect">
+            <a:avLst/>
+          </a:prstGeom>
+          <a:noFill/>
+        </p:spPr>
+        <p:txBody>
+          <a:bodyPr wrap="none" rtlCol="0">
+            <a:spAutoFit/>
+          </a:bodyPr>
+          <a:lstStyle/>
+          <a:p>
+            <a:r>
+              <a:rPr lang="en-US" sz="3600" dirty="0" smtClean="0"/>
+              <a:t>.75-1.0</a:t>
+            </a:r>
+            <a:endParaRPr lang="en-US" sz="3600" dirty="0"/>
+          </a:p>
+        </p:txBody>
+      </p:sp>
+      <p:sp>
+        <p:nvSpPr>
+          <p:cNvPr id="16" name="TextBox 15"/>
+          <p:cNvSpPr txBox="1"/>
+          <p:nvPr/>
+        </p:nvSpPr>
+        <p:spPr>
+          <a:xfrm>
+            <a:off x="4389980" y="5552303"/>
+            <a:ext cx="3807453" cy="523220"/>
+          </a:xfrm>
+          <a:prstGeom prst="rect">
+            <a:avLst/>
+          </a:prstGeom>
+          <a:noFill/>
+        </p:spPr>
+        <p:txBody>
+          <a:bodyPr wrap="none" rtlCol="0">
+            <a:spAutoFit/>
+          </a:bodyPr>
+          <a:lstStyle/>
+          <a:p>
+            <a:r>
+              <a:rPr lang="en-US" sz="2800" dirty="0" smtClean="0"/>
+              <a:t>Positivity Percentage</a:t>
+            </a:r>
+            <a:endParaRPr lang="en-US" sz="2800" dirty="0"/>
+          </a:p>
+        </p:txBody>
+      </p:sp>
     </p:spTree>
     <p:extLst>
       <p:ext uri="{BB962C8B-B14F-4D97-AF65-F5344CB8AC3E}">
-        <p14:creationId xmlns:p14="http://schemas.microsoft.com/office/powerpoint/2010/main" val="3645491392"/>
+        <p14:creationId xmlns:p14="http://schemas.microsoft.com/office/powerpoint/2010/main" val="3798327361"/>
       </p:ext>
     </p:extLst>
   </p:cSld>
@@ -6436,6 +6416,505 @@
             <p:ph type="title"/>
           </p:nvPr>
         </p:nvSpPr>
+        <p:spPr/>
+        <p:txBody>
+          <a:bodyPr/>
+          <a:lstStyle/>
+          <a:p>
+            <a:r>
+              <a:rPr lang="en-US" dirty="0" smtClean="0"/>
+              <a:t>How it works</a:t>
+            </a:r>
+            <a:endParaRPr lang="en-US" dirty="0"/>
+          </a:p>
+        </p:txBody>
+      </p:sp>
+      <p:pic>
+        <p:nvPicPr>
+          <p:cNvPr id="2050" name="Picture 2" descr="https://pbs.twimg.com/profile_images/615680132565504000/EIpgSD2K.png"/>
+          <p:cNvPicPr>
+            <a:picLocks noChangeAspect="1" noChangeArrowheads="1"/>
+          </p:cNvPicPr>
+          <p:nvPr/>
+        </p:nvPicPr>
+        <p:blipFill>
+          <a:blip r:embed="rId2">
+            <a:extLst>
+              <a:ext uri="{28A0092B-C50C-407E-A947-70E740481C1C}">
+                <a14:useLocalDpi xmlns:a14="http://schemas.microsoft.com/office/drawing/2010/main" val="0"/>
+              </a:ext>
+            </a:extLst>
+          </a:blip>
+          <a:srcRect/>
+          <a:stretch>
+            <a:fillRect/>
+          </a:stretch>
+        </p:blipFill>
+        <p:spPr bwMode="auto">
+          <a:xfrm>
+            <a:off x="0" y="1507524"/>
+            <a:ext cx="2439558" cy="2439559"/>
+          </a:xfrm>
+          <a:prstGeom prst="rect">
+            <a:avLst/>
+          </a:prstGeom>
+          <a:noFill/>
+          <a:extLst>
+            <a:ext uri="{909E8E84-426E-40DD-AFC4-6F175D3DCCD1}">
+              <a14:hiddenFill xmlns:a14="http://schemas.microsoft.com/office/drawing/2010/main">
+                <a:solidFill>
+                  <a:srgbClr val="FFFFFF"/>
+                </a:solidFill>
+              </a14:hiddenFill>
+            </a:ext>
+          </a:extLst>
+        </p:spPr>
+      </p:pic>
+      <p:pic>
+        <p:nvPicPr>
+          <p:cNvPr id="2052" name="Picture 4" descr="http://vignette4.wikia.nocookie.net/ldpsusoaweb/images/e/e4/Python.png/revision/latest?cb=20140605203715&amp;path-prefix=es"/>
+          <p:cNvPicPr>
+            <a:picLocks noChangeAspect="1" noChangeArrowheads="1"/>
+          </p:cNvPicPr>
+          <p:nvPr/>
+        </p:nvPicPr>
+        <p:blipFill>
+          <a:blip r:embed="rId3">
+            <a:extLst>
+              <a:ext uri="{28A0092B-C50C-407E-A947-70E740481C1C}">
+                <a14:useLocalDpi xmlns:a14="http://schemas.microsoft.com/office/drawing/2010/main" val="0"/>
+              </a:ext>
+            </a:extLst>
+          </a:blip>
+          <a:srcRect/>
+          <a:stretch>
+            <a:fillRect/>
+          </a:stretch>
+        </p:blipFill>
+        <p:spPr bwMode="auto">
+          <a:xfrm>
+            <a:off x="3355600" y="1878935"/>
+            <a:ext cx="1898113" cy="1898113"/>
+          </a:xfrm>
+          <a:prstGeom prst="rect">
+            <a:avLst/>
+          </a:prstGeom>
+          <a:noFill/>
+          <a:extLst>
+            <a:ext uri="{909E8E84-426E-40DD-AFC4-6F175D3DCCD1}">
+              <a14:hiddenFill xmlns:a14="http://schemas.microsoft.com/office/drawing/2010/main">
+                <a:solidFill>
+                  <a:srgbClr val="FFFFFF"/>
+                </a:solidFill>
+              </a14:hiddenFill>
+            </a:ext>
+          </a:extLst>
+        </p:spPr>
+      </p:pic>
+      <p:pic>
+        <p:nvPicPr>
+          <p:cNvPr id="2054" name="Picture 6" descr="http://staging.indico.io/static/img/big-icon.jpg"/>
+          <p:cNvPicPr>
+            <a:picLocks noChangeAspect="1" noChangeArrowheads="1"/>
+          </p:cNvPicPr>
+          <p:nvPr/>
+        </p:nvPicPr>
+        <p:blipFill>
+          <a:blip r:embed="rId4">
+            <a:extLst>
+              <a:ext uri="{28A0092B-C50C-407E-A947-70E740481C1C}">
+                <a14:useLocalDpi xmlns:a14="http://schemas.microsoft.com/office/drawing/2010/main" val="0"/>
+              </a:ext>
+            </a:extLst>
+          </a:blip>
+          <a:srcRect/>
+          <a:stretch>
+            <a:fillRect/>
+          </a:stretch>
+        </p:blipFill>
+        <p:spPr bwMode="auto">
+          <a:xfrm>
+            <a:off x="6324749" y="1775445"/>
+            <a:ext cx="1905000" cy="1905000"/>
+          </a:xfrm>
+          <a:prstGeom prst="rect">
+            <a:avLst/>
+          </a:prstGeom>
+          <a:noFill/>
+          <a:extLst>
+            <a:ext uri="{909E8E84-426E-40DD-AFC4-6F175D3DCCD1}">
+              <a14:hiddenFill xmlns:a14="http://schemas.microsoft.com/office/drawing/2010/main">
+                <a:solidFill>
+                  <a:srgbClr val="FFFFFF"/>
+                </a:solidFill>
+              </a14:hiddenFill>
+            </a:ext>
+          </a:extLst>
+        </p:spPr>
+      </p:pic>
+      <p:pic>
+        <p:nvPicPr>
+          <p:cNvPr id="2056" name="Picture 8" descr="http://www.passmark.com/images/serial-port.jpg"/>
+          <p:cNvPicPr>
+            <a:picLocks noChangeAspect="1" noChangeArrowheads="1"/>
+          </p:cNvPicPr>
+          <p:nvPr/>
+        </p:nvPicPr>
+        <p:blipFill>
+          <a:blip r:embed="rId5">
+            <a:extLst>
+              <a:ext uri="{28A0092B-C50C-407E-A947-70E740481C1C}">
+                <a14:useLocalDpi xmlns:a14="http://schemas.microsoft.com/office/drawing/2010/main" val="0"/>
+              </a:ext>
+            </a:extLst>
+          </a:blip>
+          <a:srcRect/>
+          <a:stretch>
+            <a:fillRect/>
+          </a:stretch>
+        </p:blipFill>
+        <p:spPr bwMode="auto">
+          <a:xfrm>
+            <a:off x="9138904" y="1750153"/>
+            <a:ext cx="2170734" cy="2170734"/>
+          </a:xfrm>
+          <a:prstGeom prst="rect">
+            <a:avLst/>
+          </a:prstGeom>
+          <a:noFill/>
+          <a:extLst>
+            <a:ext uri="{909E8E84-426E-40DD-AFC4-6F175D3DCCD1}">
+              <a14:hiddenFill xmlns:a14="http://schemas.microsoft.com/office/drawing/2010/main">
+                <a:solidFill>
+                  <a:srgbClr val="FFFFFF"/>
+                </a:solidFill>
+              </a14:hiddenFill>
+            </a:ext>
+          </a:extLst>
+        </p:spPr>
+      </p:pic>
+      <p:pic>
+        <p:nvPicPr>
+          <p:cNvPr id="2058" name="Picture 10" descr="https://upload.wikimedia.org/wikipedia/commons/3/38/Arduino_Uno_-_R3.jpg"/>
+          <p:cNvPicPr>
+            <a:picLocks noChangeAspect="1" noChangeArrowheads="1"/>
+          </p:cNvPicPr>
+          <p:nvPr/>
+        </p:nvPicPr>
+        <p:blipFill>
+          <a:blip r:embed="rId6">
+            <a:extLst>
+              <a:ext uri="{28A0092B-C50C-407E-A947-70E740481C1C}">
+                <a14:useLocalDpi xmlns:a14="http://schemas.microsoft.com/office/drawing/2010/main" val="0"/>
+              </a:ext>
+            </a:extLst>
+          </a:blip>
+          <a:srcRect/>
+          <a:stretch>
+            <a:fillRect/>
+          </a:stretch>
+        </p:blipFill>
+        <p:spPr bwMode="auto">
+          <a:xfrm>
+            <a:off x="2439558" y="4243431"/>
+            <a:ext cx="2369494" cy="2369494"/>
+          </a:xfrm>
+          <a:prstGeom prst="rect">
+            <a:avLst/>
+          </a:prstGeom>
+          <a:noFill/>
+          <a:extLst>
+            <a:ext uri="{909E8E84-426E-40DD-AFC4-6F175D3DCCD1}">
+              <a14:hiddenFill xmlns:a14="http://schemas.microsoft.com/office/drawing/2010/main">
+                <a:solidFill>
+                  <a:srgbClr val="FFFFFF"/>
+                </a:solidFill>
+              </a14:hiddenFill>
+            </a:ext>
+          </a:extLst>
+        </p:spPr>
+      </p:pic>
+      <p:pic>
+        <p:nvPicPr>
+          <p:cNvPr id="2060" name="Picture 12" descr="https://cdn.sparkfun.com/assets/parts/9/3/7/3/12662-01a.jpg"/>
+          <p:cNvPicPr>
+            <a:picLocks noChangeAspect="1" noChangeArrowheads="1"/>
+          </p:cNvPicPr>
+          <p:nvPr/>
+        </p:nvPicPr>
+        <p:blipFill>
+          <a:blip r:embed="rId7">
+            <a:extLst>
+              <a:ext uri="{28A0092B-C50C-407E-A947-70E740481C1C}">
+                <a14:useLocalDpi xmlns:a14="http://schemas.microsoft.com/office/drawing/2010/main" val="0"/>
+              </a:ext>
+            </a:extLst>
+          </a:blip>
+          <a:srcRect/>
+          <a:stretch>
+            <a:fillRect/>
+          </a:stretch>
+        </p:blipFill>
+        <p:spPr bwMode="auto">
+          <a:xfrm>
+            <a:off x="7297780" y="3952250"/>
+            <a:ext cx="2834762" cy="2834762"/>
+          </a:xfrm>
+          <a:prstGeom prst="rect">
+            <a:avLst/>
+          </a:prstGeom>
+          <a:noFill/>
+          <a:extLst>
+            <a:ext uri="{909E8E84-426E-40DD-AFC4-6F175D3DCCD1}">
+              <a14:hiddenFill xmlns:a14="http://schemas.microsoft.com/office/drawing/2010/main">
+                <a:solidFill>
+                  <a:srgbClr val="FFFFFF"/>
+                </a:solidFill>
+              </a14:hiddenFill>
+            </a:ext>
+          </a:extLst>
+        </p:spPr>
+      </p:pic>
+      <p:sp>
+        <p:nvSpPr>
+          <p:cNvPr id="4" name="Right Arrow 3"/>
+          <p:cNvSpPr/>
+          <p:nvPr/>
+        </p:nvSpPr>
+        <p:spPr>
+          <a:xfrm>
+            <a:off x="2331308" y="2496065"/>
+            <a:ext cx="774357" cy="667265"/>
+          </a:xfrm>
+          <a:prstGeom prst="rightArrow">
+            <a:avLst/>
+          </a:prstGeom>
+        </p:spPr>
+        <p:style>
+          <a:lnRef idx="2">
+            <a:schemeClr val="accent1">
+              <a:shade val="50000"/>
+            </a:schemeClr>
+          </a:lnRef>
+          <a:fillRef idx="1">
+            <a:schemeClr val="accent1"/>
+          </a:fillRef>
+          <a:effectRef idx="0">
+            <a:schemeClr val="accent1"/>
+          </a:effectRef>
+          <a:fontRef idx="minor">
+            <a:schemeClr val="lt1"/>
+          </a:fontRef>
+        </p:style>
+        <p:txBody>
+          <a:bodyPr rtlCol="0" anchor="ctr"/>
+          <a:lstStyle/>
+          <a:p>
+            <a:pPr algn="ctr"/>
+            <a:endParaRPr lang="en-US"/>
+          </a:p>
+        </p:txBody>
+      </p:sp>
+      <p:sp>
+        <p:nvSpPr>
+          <p:cNvPr id="11" name="Right Arrow 10"/>
+          <p:cNvSpPr/>
+          <p:nvPr/>
+        </p:nvSpPr>
+        <p:spPr>
+          <a:xfrm>
+            <a:off x="5855192" y="5035997"/>
+            <a:ext cx="774357" cy="667265"/>
+          </a:xfrm>
+          <a:prstGeom prst="rightArrow">
+            <a:avLst/>
+          </a:prstGeom>
+        </p:spPr>
+        <p:style>
+          <a:lnRef idx="2">
+            <a:schemeClr val="accent1">
+              <a:shade val="50000"/>
+            </a:schemeClr>
+          </a:lnRef>
+          <a:fillRef idx="1">
+            <a:schemeClr val="accent1"/>
+          </a:fillRef>
+          <a:effectRef idx="0">
+            <a:schemeClr val="accent1"/>
+          </a:effectRef>
+          <a:fontRef idx="minor">
+            <a:schemeClr val="lt1"/>
+          </a:fontRef>
+        </p:style>
+        <p:txBody>
+          <a:bodyPr rtlCol="0" anchor="ctr"/>
+          <a:lstStyle/>
+          <a:p>
+            <a:pPr algn="ctr"/>
+            <a:endParaRPr lang="en-US"/>
+          </a:p>
+        </p:txBody>
+      </p:sp>
+      <p:sp>
+        <p:nvSpPr>
+          <p:cNvPr id="12" name="Right Arrow 11"/>
+          <p:cNvSpPr/>
+          <p:nvPr/>
+        </p:nvSpPr>
+        <p:spPr>
+          <a:xfrm>
+            <a:off x="1219779" y="5035998"/>
+            <a:ext cx="774357" cy="667265"/>
+          </a:xfrm>
+          <a:prstGeom prst="rightArrow">
+            <a:avLst/>
+          </a:prstGeom>
+        </p:spPr>
+        <p:style>
+          <a:lnRef idx="2">
+            <a:schemeClr val="accent1">
+              <a:shade val="50000"/>
+            </a:schemeClr>
+          </a:lnRef>
+          <a:fillRef idx="1">
+            <a:schemeClr val="accent1"/>
+          </a:fillRef>
+          <a:effectRef idx="0">
+            <a:schemeClr val="accent1"/>
+          </a:effectRef>
+          <a:fontRef idx="minor">
+            <a:schemeClr val="lt1"/>
+          </a:fontRef>
+        </p:style>
+        <p:txBody>
+          <a:bodyPr rtlCol="0" anchor="ctr"/>
+          <a:lstStyle/>
+          <a:p>
+            <a:pPr algn="ctr"/>
+            <a:endParaRPr lang="en-US"/>
+          </a:p>
+        </p:txBody>
+      </p:sp>
+      <p:sp>
+        <p:nvSpPr>
+          <p:cNvPr id="13" name="Right Arrow 12"/>
+          <p:cNvSpPr/>
+          <p:nvPr/>
+        </p:nvSpPr>
+        <p:spPr>
+          <a:xfrm>
+            <a:off x="8211954" y="2501886"/>
+            <a:ext cx="774357" cy="667265"/>
+          </a:xfrm>
+          <a:prstGeom prst="rightArrow">
+            <a:avLst/>
+          </a:prstGeom>
+        </p:spPr>
+        <p:style>
+          <a:lnRef idx="2">
+            <a:schemeClr val="accent1">
+              <a:shade val="50000"/>
+            </a:schemeClr>
+          </a:lnRef>
+          <a:fillRef idx="1">
+            <a:schemeClr val="accent1"/>
+          </a:fillRef>
+          <a:effectRef idx="0">
+            <a:schemeClr val="accent1"/>
+          </a:effectRef>
+          <a:fontRef idx="minor">
+            <a:schemeClr val="lt1"/>
+          </a:fontRef>
+        </p:style>
+        <p:txBody>
+          <a:bodyPr rtlCol="0" anchor="ctr"/>
+          <a:lstStyle/>
+          <a:p>
+            <a:pPr algn="ctr"/>
+            <a:endParaRPr lang="en-US"/>
+          </a:p>
+        </p:txBody>
+      </p:sp>
+      <p:sp>
+        <p:nvSpPr>
+          <p:cNvPr id="14" name="Right Arrow 13"/>
+          <p:cNvSpPr/>
+          <p:nvPr/>
+        </p:nvSpPr>
+        <p:spPr>
+          <a:xfrm>
+            <a:off x="5468014" y="2501887"/>
+            <a:ext cx="774357" cy="667265"/>
+          </a:xfrm>
+          <a:prstGeom prst="rightArrow">
+            <a:avLst/>
+          </a:prstGeom>
+        </p:spPr>
+        <p:style>
+          <a:lnRef idx="2">
+            <a:schemeClr val="accent1">
+              <a:shade val="50000"/>
+            </a:schemeClr>
+          </a:lnRef>
+          <a:fillRef idx="1">
+            <a:schemeClr val="accent1"/>
+          </a:fillRef>
+          <a:effectRef idx="0">
+            <a:schemeClr val="accent1"/>
+          </a:effectRef>
+          <a:fontRef idx="minor">
+            <a:schemeClr val="lt1"/>
+          </a:fontRef>
+        </p:style>
+        <p:txBody>
+          <a:bodyPr rtlCol="0" anchor="ctr"/>
+          <a:lstStyle/>
+          <a:p>
+            <a:pPr algn="ctr"/>
+            <a:endParaRPr lang="en-US"/>
+          </a:p>
+        </p:txBody>
+      </p:sp>
+    </p:spTree>
+    <p:extLst>
+      <p:ext uri="{BB962C8B-B14F-4D97-AF65-F5344CB8AC3E}">
+        <p14:creationId xmlns:p14="http://schemas.microsoft.com/office/powerpoint/2010/main" val="3645491392"/>
+      </p:ext>
+    </p:extLst>
+  </p:cSld>
+  <p:clrMapOvr>
+    <a:masterClrMapping/>
+  </p:clrMapOvr>
+</p:sld>
+</file>
+
+<file path=ppt/slides/slide5.xml><?xml version="1.0" encoding="utf-8"?>
+<p:sld xmlns:a="http://schemas.openxmlformats.org/drawingml/2006/main" xmlns:r="http://schemas.openxmlformats.org/officeDocument/2006/relationships" xmlns:p="http://schemas.openxmlformats.org/presentationml/2006/main">
+  <p:cSld>
+    <p:spTree>
+      <p:nvGrpSpPr>
+        <p:cNvPr id="1" name=""/>
+        <p:cNvGrpSpPr/>
+        <p:nvPr/>
+      </p:nvGrpSpPr>
+      <p:grpSpPr>
+        <a:xfrm>
+          <a:off x="0" y="0"/>
+          <a:ext cx="0" cy="0"/>
+          <a:chOff x="0" y="0"/>
+          <a:chExt cx="0" cy="0"/>
+        </a:xfrm>
+      </p:grpSpPr>
+      <p:sp>
+        <p:nvSpPr>
+          <p:cNvPr id="2" name="Title 1"/>
+          <p:cNvSpPr>
+            <a:spLocks noGrp="1"/>
+          </p:cNvSpPr>
+          <p:nvPr>
+            <p:ph type="title"/>
+          </p:nvPr>
+        </p:nvSpPr>
         <p:spPr>
           <a:xfrm>
             <a:off x="2989276" y="500762"/>
@@ -6588,7 +7067,7 @@
 </p:sld>
 </file>
 
-<file path=ppt/slides/slide5.xml><?xml version="1.0" encoding="utf-8"?>
+<file path=ppt/slides/slide6.xml><?xml version="1.0" encoding="utf-8"?>
 <p:sld xmlns:a="http://schemas.openxmlformats.org/drawingml/2006/main" xmlns:r="http://schemas.openxmlformats.org/officeDocument/2006/relationships" xmlns:p="http://schemas.openxmlformats.org/presentationml/2006/main">
   <p:cSld>
     <p:spTree>

</xml_diff>